<commit_message>
update on figures, again, with some bib items
</commit_message>
<xml_diff>
--- a/figures/figure.pptx
+++ b/figures/figure.pptx
@@ -5700,9 +5700,7 @@
             <a:avLst/>
           </a:prstGeom>
           <a:solidFill>
-            <a:schemeClr val="tx2">
-              <a:lumMod val="50000"/>
-            </a:schemeClr>
+            <a:schemeClr val="accent1"/>
           </a:solidFill>
           <a:ln>
             <a:solidFill>
@@ -5751,9 +5749,7 @@
             <a:avLst/>
           </a:prstGeom>
           <a:solidFill>
-            <a:schemeClr val="tx2">
-              <a:lumMod val="50000"/>
-            </a:schemeClr>
+            <a:schemeClr val="accent1"/>
           </a:solidFill>
           <a:ln>
             <a:solidFill>
@@ -5807,9 +5803,7 @@
             <a:avLst/>
           </a:prstGeom>
           <a:solidFill>
-            <a:schemeClr val="tx2">
-              <a:lumMod val="50000"/>
-            </a:schemeClr>
+            <a:schemeClr val="accent1"/>
           </a:solidFill>
           <a:ln>
             <a:solidFill>
@@ -6766,19 +6760,8 @@
                 <a:latin typeface="Verdana"/>
                 <a:cs typeface="Verdana"/>
               </a:rPr>
-              <a:t>multi-level </a:t>
+              <a:t>multi-level alignment</a:t>
             </a:r>
-            <a:r>
-              <a:rPr lang="en-US" sz="1000" dirty="0" smtClean="0">
-                <a:latin typeface="Verdana"/>
-                <a:cs typeface="Verdana"/>
-              </a:rPr>
-              <a:t>alignment</a:t>
-            </a:r>
-            <a:endParaRPr lang="en-US" sz="1000" dirty="0" smtClean="0">
-              <a:latin typeface="Verdana"/>
-              <a:cs typeface="Verdana"/>
-            </a:endParaRPr>
           </a:p>
         </p:txBody>
       </p:sp>
@@ -6885,20 +6868,18 @@
       <p:cxnSp>
         <p:nvCxnSpPr>
           <p:cNvPr id="4" name="Straight Connector 3"/>
-          <p:cNvCxnSpPr>
-            <a:stCxn id="306" idx="3"/>
-            <a:endCxn id="2" idx="2"/>
-          </p:cNvCxnSpPr>
+          <p:cNvCxnSpPr/>
           <p:nvPr/>
         </p:nvCxnSpPr>
         <p:spPr>
           <a:xfrm>
-            <a:off x="1468446" y="2258001"/>
-            <a:ext cx="171234" cy="142377"/>
+            <a:off x="1476912" y="2258001"/>
+            <a:ext cx="252121" cy="58313"/>
           </a:xfrm>
           <a:prstGeom prst="line">
             <a:avLst/>
           </a:prstGeom>
+          <a:ln w="12700" cmpd="sng"/>
         </p:spPr>
         <p:style>
           <a:lnRef idx="2">
@@ -6932,6 +6913,7 @@
           <a:prstGeom prst="line">
             <a:avLst/>
           </a:prstGeom>
+          <a:ln w="12700" cmpd="sng"/>
         </p:spPr>
         <p:style>
           <a:lnRef idx="2">
@@ -6953,18 +6935,18 @@
           <p:cNvPr id="8" name="Straight Connector 7"/>
           <p:cNvCxnSpPr>
             <a:stCxn id="308" idx="3"/>
-            <a:endCxn id="2" idx="2"/>
           </p:cNvCxnSpPr>
           <p:nvPr/>
         </p:nvCxnSpPr>
         <p:spPr>
           <a:xfrm flipV="1">
-            <a:off x="1473160" y="2400378"/>
-            <a:ext cx="166520" cy="145622"/>
+            <a:off x="1473160" y="2514600"/>
+            <a:ext cx="190877" cy="31400"/>
           </a:xfrm>
           <a:prstGeom prst="line">
             <a:avLst/>
           </a:prstGeom>
+          <a:ln w="12700" cmpd="sng"/>
         </p:spPr>
         <p:style>
           <a:lnRef idx="2">
@@ -7046,16 +7028,14 @@
         </p:nvSpPr>
         <p:spPr>
           <a:xfrm>
-            <a:off x="1350904" y="2208314"/>
+            <a:off x="1317040" y="2208314"/>
             <a:ext cx="94665" cy="108000"/>
           </a:xfrm>
           <a:prstGeom prst="ellipse">
             <a:avLst/>
           </a:prstGeom>
           <a:solidFill>
-            <a:schemeClr val="tx2">
-              <a:lumMod val="50000"/>
-            </a:schemeClr>
+            <a:schemeClr val="accent1"/>
           </a:solidFill>
           <a:ln>
             <a:solidFill>
@@ -7104,16 +7084,14 @@
         </p:nvSpPr>
         <p:spPr>
           <a:xfrm>
-            <a:off x="1346302" y="2338972"/>
+            <a:off x="1312438" y="2338972"/>
             <a:ext cx="108000" cy="108000"/>
           </a:xfrm>
           <a:prstGeom prst="triangle">
             <a:avLst/>
           </a:prstGeom>
           <a:solidFill>
-            <a:schemeClr val="tx2">
-              <a:lumMod val="50000"/>
-            </a:schemeClr>
+            <a:schemeClr val="accent1"/>
           </a:solidFill>
           <a:ln>
             <a:solidFill>
@@ -7162,16 +7140,14 @@
         </p:nvSpPr>
         <p:spPr>
           <a:xfrm>
-            <a:off x="1341160" y="2490437"/>
+            <a:off x="1307296" y="2490437"/>
             <a:ext cx="119502" cy="108000"/>
           </a:xfrm>
           <a:prstGeom prst="star7">
             <a:avLst/>
           </a:prstGeom>
           <a:solidFill>
-            <a:schemeClr val="tx2">
-              <a:lumMod val="50000"/>
-            </a:schemeClr>
+            <a:schemeClr val="accent1"/>
           </a:solidFill>
           <a:ln>
             <a:solidFill>

</xml_diff>